<commit_message>
dodan link demonstracije app
</commit_message>
<xml_diff>
--- a/DOKUMENTACIJA/webappRecepti.pptx
+++ b/DOKUMENTACIJA/webappRecepti.pptx
@@ -352,7 +352,7 @@
           <a:p>
             <a:fld id="{6A4E864B-84AA-430A-AB2F-B98E7506A791}" type="datetimeFigureOut">
               <a:rPr lang="hr-HR" smtClean="0"/>
-              <a:t>14.4.2024.</a:t>
+              <a:t>16.4.2024.</a:t>
             </a:fld>
             <a:endParaRPr lang="hr-HR"/>
           </a:p>
@@ -609,7 +609,7 @@
           <a:p>
             <a:fld id="{6A4E864B-84AA-430A-AB2F-B98E7506A791}" type="datetimeFigureOut">
               <a:rPr lang="hr-HR" smtClean="0"/>
-              <a:t>14.4.2024.</a:t>
+              <a:t>16.4.2024.</a:t>
             </a:fld>
             <a:endParaRPr lang="hr-HR"/>
           </a:p>
@@ -779,7 +779,7 @@
           <a:p>
             <a:fld id="{6A4E864B-84AA-430A-AB2F-B98E7506A791}" type="datetimeFigureOut">
               <a:rPr lang="hr-HR" smtClean="0"/>
-              <a:t>14.4.2024.</a:t>
+              <a:t>16.4.2024.</a:t>
             </a:fld>
             <a:endParaRPr lang="hr-HR"/>
           </a:p>
@@ -959,7 +959,7 @@
           <a:p>
             <a:fld id="{6A4E864B-84AA-430A-AB2F-B98E7506A791}" type="datetimeFigureOut">
               <a:rPr lang="hr-HR" smtClean="0"/>
-              <a:t>14.4.2024.</a:t>
+              <a:t>16.4.2024.</a:t>
             </a:fld>
             <a:endParaRPr lang="hr-HR"/>
           </a:p>
@@ -1243,7 +1243,7 @@
           <a:p>
             <a:fld id="{6A4E864B-84AA-430A-AB2F-B98E7506A791}" type="datetimeFigureOut">
               <a:rPr lang="hr-HR" smtClean="0"/>
-              <a:t>14.4.2024.</a:t>
+              <a:t>16.4.2024.</a:t>
             </a:fld>
             <a:endParaRPr lang="hr-HR"/>
           </a:p>
@@ -1492,7 +1492,7 @@
           <a:p>
             <a:fld id="{6A4E864B-84AA-430A-AB2F-B98E7506A791}" type="datetimeFigureOut">
               <a:rPr lang="hr-HR" smtClean="0"/>
-              <a:t>14.4.2024.</a:t>
+              <a:t>16.4.2024.</a:t>
             </a:fld>
             <a:endParaRPr lang="hr-HR"/>
           </a:p>
@@ -1738,7 +1738,7 @@
           <a:p>
             <a:fld id="{6A4E864B-84AA-430A-AB2F-B98E7506A791}" type="datetimeFigureOut">
               <a:rPr lang="hr-HR" smtClean="0"/>
-              <a:t>14.4.2024.</a:t>
+              <a:t>16.4.2024.</a:t>
             </a:fld>
             <a:endParaRPr lang="hr-HR"/>
           </a:p>
@@ -2026,7 +2026,7 @@
           <a:p>
             <a:fld id="{6A4E864B-84AA-430A-AB2F-B98E7506A791}" type="datetimeFigureOut">
               <a:rPr lang="hr-HR" smtClean="0"/>
-              <a:t>14.4.2024.</a:t>
+              <a:t>16.4.2024.</a:t>
             </a:fld>
             <a:endParaRPr lang="hr-HR"/>
           </a:p>
@@ -2516,7 +2516,7 @@
           <a:p>
             <a:fld id="{6A4E864B-84AA-430A-AB2F-B98E7506A791}" type="datetimeFigureOut">
               <a:rPr lang="hr-HR" smtClean="0"/>
-              <a:t>14.4.2024.</a:t>
+              <a:t>16.4.2024.</a:t>
             </a:fld>
             <a:endParaRPr lang="hr-HR"/>
           </a:p>
@@ -2634,7 +2634,7 @@
           <a:p>
             <a:fld id="{6A4E864B-84AA-430A-AB2F-B98E7506A791}" type="datetimeFigureOut">
               <a:rPr lang="hr-HR" smtClean="0"/>
-              <a:t>14.4.2024.</a:t>
+              <a:t>16.4.2024.</a:t>
             </a:fld>
             <a:endParaRPr lang="hr-HR"/>
           </a:p>
@@ -2729,7 +2729,7 @@
           <a:p>
             <a:fld id="{6A4E864B-84AA-430A-AB2F-B98E7506A791}" type="datetimeFigureOut">
               <a:rPr lang="hr-HR" smtClean="0"/>
-              <a:t>14.4.2024.</a:t>
+              <a:t>16.4.2024.</a:t>
             </a:fld>
             <a:endParaRPr lang="hr-HR"/>
           </a:p>
@@ -3006,7 +3006,7 @@
           <a:p>
             <a:fld id="{6A4E864B-84AA-430A-AB2F-B98E7506A791}" type="datetimeFigureOut">
               <a:rPr lang="hr-HR" smtClean="0"/>
-              <a:t>14.4.2024.</a:t>
+              <a:t>16.4.2024.</a:t>
             </a:fld>
             <a:endParaRPr lang="hr-HR"/>
           </a:p>
@@ -3228,7 +3228,7 @@
           <a:p>
             <a:fld id="{6A4E864B-84AA-430A-AB2F-B98E7506A791}" type="datetimeFigureOut">
               <a:rPr lang="hr-HR" smtClean="0"/>
-              <a:t>14.4.2024.</a:t>
+              <a:t>16.4.2024.</a:t>
             </a:fld>
             <a:endParaRPr lang="hr-HR"/>
           </a:p>
@@ -4923,7 +4923,7 @@
         </p:spPr>
         <p:txBody>
           <a:bodyPr anchor="ctr">
-            <a:normAutofit/>
+            <a:normAutofit fontScale="90000"/>
           </a:bodyPr>
           <a:lstStyle/>
           <a:p>
@@ -4931,6 +4931,23 @@
               <a:rPr lang="hr-HR" sz="6000" b="1" dirty="0"/>
               <a:t>DEMONSTRACIJA APLIKACIJE</a:t>
             </a:r>
+            <a:br>
+              <a:rPr lang="hr-HR" sz="6000" b="1" dirty="0"/>
+            </a:br>
+            <a:r>
+              <a:rPr lang="hr-HR" sz="4000" b="1" dirty="0">
+                <a:solidFill>
+                  <a:srgbClr val="0070C0"/>
+                </a:solidFill>
+                <a:hlinkClick r:id="rId2"/>
+              </a:rPr>
+              <a:t>https://www.youtube.com/watch?v=Tod6pIuoQfA</a:t>
+            </a:r>
+            <a:endParaRPr lang="hr-HR" sz="6000" b="1" dirty="0">
+              <a:solidFill>
+                <a:srgbClr val="0070C0"/>
+              </a:solidFill>
+            </a:endParaRPr>
           </a:p>
         </p:txBody>
       </p:sp>

</xml_diff>